<commit_message>
Atualizando a tela swing
</commit_message>
<xml_diff>
--- a/Ideação/Requisitos/User Stories.pptx
+++ b/Ideação/Requisitos/User Stories.pptx
@@ -261,7 +261,7 @@
           <a:p>
             <a:fld id="{FF510886-C572-4804-8F43-1CB06F629938}" type="datetimeFigureOut">
               <a:rPr lang="pt-BR" smtClean="0"/>
-              <a:t>29/03/2022</a:t>
+              <a:t>19/04/2022</a:t>
             </a:fld>
             <a:endParaRPr lang="pt-BR"/>
           </a:p>
@@ -459,7 +459,7 @@
           <a:p>
             <a:fld id="{FF510886-C572-4804-8F43-1CB06F629938}" type="datetimeFigureOut">
               <a:rPr lang="pt-BR" smtClean="0"/>
-              <a:t>29/03/2022</a:t>
+              <a:t>19/04/2022</a:t>
             </a:fld>
             <a:endParaRPr lang="pt-BR"/>
           </a:p>
@@ -667,7 +667,7 @@
           <a:p>
             <a:fld id="{FF510886-C572-4804-8F43-1CB06F629938}" type="datetimeFigureOut">
               <a:rPr lang="pt-BR" smtClean="0"/>
-              <a:t>29/03/2022</a:t>
+              <a:t>19/04/2022</a:t>
             </a:fld>
             <a:endParaRPr lang="pt-BR"/>
           </a:p>
@@ -865,7 +865,7 @@
           <a:p>
             <a:fld id="{FF510886-C572-4804-8F43-1CB06F629938}" type="datetimeFigureOut">
               <a:rPr lang="pt-BR" smtClean="0"/>
-              <a:t>29/03/2022</a:t>
+              <a:t>19/04/2022</a:t>
             </a:fld>
             <a:endParaRPr lang="pt-BR"/>
           </a:p>
@@ -1140,7 +1140,7 @@
           <a:p>
             <a:fld id="{FF510886-C572-4804-8F43-1CB06F629938}" type="datetimeFigureOut">
               <a:rPr lang="pt-BR" smtClean="0"/>
-              <a:t>29/03/2022</a:t>
+              <a:t>19/04/2022</a:t>
             </a:fld>
             <a:endParaRPr lang="pt-BR"/>
           </a:p>
@@ -1405,7 +1405,7 @@
           <a:p>
             <a:fld id="{FF510886-C572-4804-8F43-1CB06F629938}" type="datetimeFigureOut">
               <a:rPr lang="pt-BR" smtClean="0"/>
-              <a:t>29/03/2022</a:t>
+              <a:t>19/04/2022</a:t>
             </a:fld>
             <a:endParaRPr lang="pt-BR"/>
           </a:p>
@@ -1817,7 +1817,7 @@
           <a:p>
             <a:fld id="{FF510886-C572-4804-8F43-1CB06F629938}" type="datetimeFigureOut">
               <a:rPr lang="pt-BR" smtClean="0"/>
-              <a:t>29/03/2022</a:t>
+              <a:t>19/04/2022</a:t>
             </a:fld>
             <a:endParaRPr lang="pt-BR"/>
           </a:p>
@@ -1958,7 +1958,7 @@
           <a:p>
             <a:fld id="{FF510886-C572-4804-8F43-1CB06F629938}" type="datetimeFigureOut">
               <a:rPr lang="pt-BR" smtClean="0"/>
-              <a:t>29/03/2022</a:t>
+              <a:t>19/04/2022</a:t>
             </a:fld>
             <a:endParaRPr lang="pt-BR"/>
           </a:p>
@@ -2071,7 +2071,7 @@
           <a:p>
             <a:fld id="{FF510886-C572-4804-8F43-1CB06F629938}" type="datetimeFigureOut">
               <a:rPr lang="pt-BR" smtClean="0"/>
-              <a:t>29/03/2022</a:t>
+              <a:t>19/04/2022</a:t>
             </a:fld>
             <a:endParaRPr lang="pt-BR"/>
           </a:p>
@@ -2382,7 +2382,7 @@
           <a:p>
             <a:fld id="{FF510886-C572-4804-8F43-1CB06F629938}" type="datetimeFigureOut">
               <a:rPr lang="pt-BR" smtClean="0"/>
-              <a:t>29/03/2022</a:t>
+              <a:t>19/04/2022</a:t>
             </a:fld>
             <a:endParaRPr lang="pt-BR"/>
           </a:p>
@@ -2670,7 +2670,7 @@
           <a:p>
             <a:fld id="{FF510886-C572-4804-8F43-1CB06F629938}" type="datetimeFigureOut">
               <a:rPr lang="pt-BR" smtClean="0"/>
-              <a:t>29/03/2022</a:t>
+              <a:t>19/04/2022</a:t>
             </a:fld>
             <a:endParaRPr lang="pt-BR"/>
           </a:p>
@@ -2911,7 +2911,7 @@
           <a:p>
             <a:fld id="{FF510886-C572-4804-8F43-1CB06F629938}" type="datetimeFigureOut">
               <a:rPr lang="pt-BR" smtClean="0"/>
-              <a:t>29/03/2022</a:t>
+              <a:t>19/04/2022</a:t>
             </a:fld>
             <a:endParaRPr lang="pt-BR"/>
           </a:p>
@@ -3962,8 +3962,8 @@
         </p:nvSpPr>
         <p:spPr>
           <a:xfrm>
-            <a:off x="242639" y="241342"/>
-            <a:ext cx="3030648" cy="2316327"/>
+            <a:off x="242638" y="241342"/>
+            <a:ext cx="3242683" cy="2316327"/>
           </a:xfrm>
           <a:prstGeom prst="roundRect">
             <a:avLst/>
@@ -4016,7 +4016,10 @@
             </a:r>
           </a:p>
           <a:p>
-            <a:pPr algn="ctr"/>
+            <a:pPr marL="285750" indent="-285750" algn="ctr">
+              <a:buFont typeface="Arial" panose="020B0604020202020204" pitchFamily="34" charset="0"/>
+              <a:buChar char="•"/>
+            </a:pPr>
             <a:r>
               <a:rPr lang="pt-BR" b="0" i="0" dirty="0">
                 <a:solidFill>
@@ -4050,7 +4053,7 @@
         <p:spPr>
           <a:xfrm>
             <a:off x="3668327" y="244145"/>
-            <a:ext cx="4137203" cy="2316327"/>
+            <a:ext cx="4269725" cy="2316327"/>
           </a:xfrm>
           <a:prstGeom prst="roundRect">
             <a:avLst/>
@@ -4103,7 +4106,10 @@
             </a:r>
           </a:p>
           <a:p>
-            <a:pPr algn="ctr"/>
+            <a:pPr marL="285750" indent="-285750" algn="ctr">
+              <a:buFont typeface="Arial" panose="020B0604020202020204" pitchFamily="34" charset="0"/>
+              <a:buChar char="•"/>
+            </a:pPr>
             <a:r>
               <a:rPr lang="pt-BR" b="0" i="0" dirty="0">
                 <a:solidFill>
@@ -4112,7 +4118,7 @@
                 <a:effectLst/>
                 <a:latin typeface="Calibri" panose="020F0502020204030204" pitchFamily="34" charset="0"/>
               </a:rPr>
-              <a:t>Eu, como Administrador da Estação de metro, preciso de uma informação do status de atendimento da máquina, para saber se o suporte está a caminho, se será resolvido no futuro ou se ainda não tem prazo de solução</a:t>
+              <a:t>Eu, como Administrador da Estação de metro, preciso de uma informação do status de atendimento da máquina, para saber se o suporte está a caminho, se será resolvido no futuro ou se ainda não tem prazo de solução.</a:t>
             </a:r>
             <a:endParaRPr lang="pt-BR" dirty="0">
               <a:solidFill>
@@ -4136,8 +4142,8 @@
         </p:nvSpPr>
         <p:spPr>
           <a:xfrm>
-            <a:off x="8200569" y="241342"/>
-            <a:ext cx="3554109" cy="2316327"/>
+            <a:off x="8200570" y="241342"/>
+            <a:ext cx="3487062" cy="2316327"/>
           </a:xfrm>
           <a:prstGeom prst="roundRect">
             <a:avLst/>
@@ -4190,7 +4196,10 @@
             </a:r>
           </a:p>
           <a:p>
-            <a:pPr algn="ctr"/>
+            <a:pPr marL="285750" indent="-285750" algn="ctr">
+              <a:buFont typeface="Arial" panose="020B0604020202020204" pitchFamily="34" charset="0"/>
+              <a:buChar char="•"/>
+            </a:pPr>
             <a:r>
               <a:rPr lang="pt-BR" b="0" i="0" dirty="0">
                 <a:solidFill>
@@ -4199,27 +4208,7 @@
                 <a:effectLst/>
                 <a:latin typeface="Calibri" panose="020F0502020204030204" pitchFamily="34" charset="0"/>
               </a:rPr>
-              <a:t>Eu, como </a:t>
-            </a:r>
-            <a:r>
-              <a:rPr lang="pt-BR" b="0" i="0" dirty="0" err="1">
-                <a:solidFill>
-                  <a:srgbClr val="000000"/>
-                </a:solidFill>
-                <a:effectLst/>
-                <a:latin typeface="Calibri" panose="020F0502020204030204" pitchFamily="34" charset="0"/>
-              </a:rPr>
-              <a:t>Adm</a:t>
-            </a:r>
-            <a:r>
-              <a:rPr lang="pt-BR" b="0" i="0" dirty="0">
-                <a:solidFill>
-                  <a:srgbClr val="000000"/>
-                </a:solidFill>
-                <a:effectLst/>
-                <a:latin typeface="Calibri" panose="020F0502020204030204" pitchFamily="34" charset="0"/>
-              </a:rPr>
-              <a:t>, prefiro que nossos totens rodem em maquinas virtuais, para evitar problemas com hardware local</a:t>
+              <a:t>Eu, como Administrador, prefiro que nossos totens rodem em maquinas virtuais, para evitar problemas com hardware local</a:t>
             </a:r>
             <a:endParaRPr lang="pt-BR" dirty="0">
               <a:solidFill>
@@ -4245,7 +4234,7 @@
         <p:spPr>
           <a:xfrm>
             <a:off x="242639" y="2951413"/>
-            <a:ext cx="4137203" cy="2316327"/>
+            <a:ext cx="4269725" cy="2316327"/>
           </a:xfrm>
           <a:prstGeom prst="roundRect">
             <a:avLst/>
@@ -4298,7 +4287,10 @@
             </a:r>
           </a:p>
           <a:p>
-            <a:pPr algn="ctr"/>
+            <a:pPr marL="285750" indent="-285750" algn="ctr">
+              <a:buFont typeface="Arial" panose="020B0604020202020204" pitchFamily="34" charset="0"/>
+              <a:buChar char="•"/>
+            </a:pPr>
             <a:r>
               <a:rPr lang="pt-BR" b="0" i="0" dirty="0">
                 <a:solidFill>
@@ -4333,7 +4325,7 @@
         <p:spPr>
           <a:xfrm>
             <a:off x="4675492" y="2951412"/>
-            <a:ext cx="3395082" cy="2316327"/>
+            <a:ext cx="3487062" cy="2316327"/>
           </a:xfrm>
           <a:prstGeom prst="roundRect">
             <a:avLst/>
@@ -4386,7 +4378,10 @@
             </a:r>
           </a:p>
           <a:p>
-            <a:pPr algn="ctr"/>
+            <a:pPr marL="285750" indent="-285750" algn="ctr">
+              <a:buFont typeface="Arial" panose="020B0604020202020204" pitchFamily="34" charset="0"/>
+              <a:buChar char="•"/>
+            </a:pPr>
             <a:r>
               <a:rPr lang="pt-BR" b="0" i="0" dirty="0">
                 <a:solidFill>
@@ -4395,7 +4390,7 @@
                 <a:effectLst/>
                 <a:latin typeface="Calibri" panose="020F0502020204030204" pitchFamily="34" charset="0"/>
               </a:rPr>
-              <a:t>Eu como suporte, necessito de uma descrição mais detalhada do problema para encontrar uma solução de forma mais rápida e eficiente</a:t>
+              <a:t>Eu como suporte, necessito de uma descrição mais detalhada do problema para encontrar uma solução de forma mais rápida e eficiente.</a:t>
             </a:r>
             <a:endParaRPr lang="pt-BR" dirty="0">
               <a:solidFill>
@@ -4474,7 +4469,10 @@
             </a:r>
           </a:p>
           <a:p>
-            <a:pPr algn="ctr"/>
+            <a:pPr marL="285750" indent="-285750" algn="ctr">
+              <a:buFont typeface="Arial" panose="020B0604020202020204" pitchFamily="34" charset="0"/>
+              <a:buChar char="•"/>
+            </a:pPr>
             <a:r>
               <a:rPr lang="pt-BR" b="0" i="0" dirty="0">
                 <a:solidFill>
@@ -4503,7 +4501,7 @@
                 <a:effectLst/>
                 <a:latin typeface="Calibri" panose="020F0502020204030204" pitchFamily="34" charset="0"/>
               </a:rPr>
-              <a:t> ou SMS para saber se a minha compra ou recarga do bilhete foi efetuada com sucesso</a:t>
+              <a:t> ou SMS para saber se a minha compra ou recarga do bilhete foi efetuada com sucesso.</a:t>
             </a:r>
             <a:endParaRPr lang="pt-BR" dirty="0">
               <a:solidFill>
@@ -4558,8 +4556,8 @@
         </p:nvSpPr>
         <p:spPr>
           <a:xfrm>
-            <a:off x="242639" y="241342"/>
-            <a:ext cx="3030648" cy="2316327"/>
+            <a:off x="242638" y="241342"/>
+            <a:ext cx="3425690" cy="2316327"/>
           </a:xfrm>
           <a:prstGeom prst="roundRect">
             <a:avLst/>
@@ -4612,7 +4610,10 @@
             </a:r>
           </a:p>
           <a:p>
-            <a:pPr algn="ctr"/>
+            <a:pPr marL="285750" indent="-285750" algn="ctr">
+              <a:buFont typeface="Arial" panose="020B0604020202020204" pitchFamily="34" charset="0"/>
+              <a:buChar char="•"/>
+            </a:pPr>
             <a:r>
               <a:rPr lang="pt-BR" b="0" i="0" dirty="0">
                 <a:solidFill>
@@ -4621,7 +4622,26 @@
                 <a:effectLst/>
                 <a:latin typeface="Calibri" panose="020F0502020204030204" pitchFamily="34" charset="0"/>
               </a:rPr>
-              <a:t>Eu como ADM preciso de uma lista simples de quantidade de transações e lucro líquido por estação para criar um relatório para meus superiores</a:t>
+              <a:t>Eu como </a:t>
+            </a:r>
+            <a:r>
+              <a:rPr lang="pt-BR" dirty="0">
+                <a:solidFill>
+                  <a:srgbClr val="000000"/>
+                </a:solidFill>
+                <a:latin typeface="Calibri" panose="020F0502020204030204" pitchFamily="34" charset="0"/>
+              </a:rPr>
+              <a:t>administrador </a:t>
+            </a:r>
+            <a:r>
+              <a:rPr lang="pt-BR" b="0" i="0" dirty="0">
+                <a:solidFill>
+                  <a:srgbClr val="000000"/>
+                </a:solidFill>
+                <a:effectLst/>
+                <a:latin typeface="Calibri" panose="020F0502020204030204" pitchFamily="34" charset="0"/>
+              </a:rPr>
+              <a:t>preciso de uma lista simples de quantidade de transações e lucro líquido por estação para criar um relatório para meus superiores.</a:t>
             </a:r>
             <a:endParaRPr lang="pt-BR" dirty="0">
               <a:solidFill>
@@ -4646,8 +4666,8 @@
         </p:nvSpPr>
         <p:spPr>
           <a:xfrm>
-            <a:off x="3668328" y="244145"/>
-            <a:ext cx="3713134" cy="2316327"/>
+            <a:off x="3888728" y="212925"/>
+            <a:ext cx="3920116" cy="2316327"/>
           </a:xfrm>
           <a:prstGeom prst="roundRect">
             <a:avLst/>
@@ -4700,7 +4720,10 @@
             </a:r>
           </a:p>
           <a:p>
-            <a:pPr algn="ctr"/>
+            <a:pPr marL="285750" indent="-285750" algn="ctr">
+              <a:buFont typeface="Arial" panose="020B0604020202020204" pitchFamily="34" charset="0"/>
+              <a:buChar char="•"/>
+            </a:pPr>
             <a:r>
               <a:rPr lang="pt-BR" b="0" i="0" dirty="0">
                 <a:solidFill>
@@ -4734,8 +4757,8 @@
         </p:nvSpPr>
         <p:spPr>
           <a:xfrm>
-            <a:off x="8200569" y="241342"/>
-            <a:ext cx="3554109" cy="2316327"/>
+            <a:off x="8029245" y="212925"/>
+            <a:ext cx="3920116" cy="2541615"/>
           </a:xfrm>
           <a:prstGeom prst="roundRect">
             <a:avLst/>
@@ -4784,8 +4807,30 @@
                 </a:solidFill>
                 <a:latin typeface="Comic Sans MS" panose="030F0702030302020204" pitchFamily="66" charset="0"/>
               </a:rPr>
-              <a:t>#</a:t>
-            </a:r>
+              <a:t>#15</a:t>
+            </a:r>
+          </a:p>
+          <a:p>
+            <a:pPr marL="285750" indent="-285750" algn="ctr">
+              <a:buFont typeface="Arial" panose="020B0604020202020204" pitchFamily="34" charset="0"/>
+              <a:buChar char="•"/>
+            </a:pPr>
+            <a:r>
+              <a:rPr lang="pt-BR" b="0" i="0" dirty="0">
+                <a:solidFill>
+                  <a:srgbClr val="000000"/>
+                </a:solidFill>
+                <a:effectLst/>
+                <a:latin typeface="Calibri" panose="020F0502020204030204" pitchFamily="34" charset="0"/>
+              </a:rPr>
+              <a:t>eu como administração necessito de um relatório com o histórico de totem para conseguir ter uma tomada de decisão mais precisa, conseguir fazer a administração financeira da empresa e gerar relatórios sobre eles.</a:t>
+            </a:r>
+            <a:endParaRPr lang="pt-BR" dirty="0">
+              <a:solidFill>
+                <a:schemeClr val="tx1"/>
+              </a:solidFill>
+              <a:latin typeface="Comic Sans MS" panose="030F0702030302020204" pitchFamily="66" charset="0"/>
+            </a:endParaRPr>
           </a:p>
         </p:txBody>
       </p:sp>
@@ -5305,6 +5350,15 @@
 </file>
 
 <file path=customXml/item1.xml><?xml version="1.0" encoding="utf-8"?>
+<?mso-contentType ?>
+<FormTemplates xmlns="http://schemas.microsoft.com/sharepoint/v3/contenttype/forms">
+  <Display>DocumentLibraryForm</Display>
+  <Edit>DocumentLibraryForm</Edit>
+  <New>DocumentLibraryForm</New>
+</FormTemplates>
+</file>
+
+<file path=customXml/item2.xml><?xml version="1.0" encoding="utf-8"?>
 <ct:contentTypeSchema xmlns:ct="http://schemas.microsoft.com/office/2006/metadata/contentType" xmlns:ma="http://schemas.microsoft.com/office/2006/metadata/properties/metaAttributes" ct:_="" ma:_="" ma:contentTypeName="Document" ma:contentTypeID="0x010100B8E26B6800077740943CAA0EE0A90325" ma:contentTypeVersion="7" ma:contentTypeDescription="Create a new document." ma:contentTypeScope="" ma:versionID="0711fdf738977bd3d643cb8d8f4e109e">
   <xsd:schema xmlns:xsd="http://www.w3.org/2001/XMLSchema" xmlns:xs="http://www.w3.org/2001/XMLSchema" xmlns:p="http://schemas.microsoft.com/office/2006/metadata/properties" xmlns:ns3="c14df721-83d0-478d-aefc-5e63513a87b4" xmlns:ns4="659efe37-a1ff-41bd-b7f7-e81fdb610ca5" targetNamespace="http://schemas.microsoft.com/office/2006/metadata/properties" ma:root="true" ma:fieldsID="52fa32d5a246e73aa5f6857eb071c8cc" ns3:_="" ns4:_="">
     <xsd:import namespace="c14df721-83d0-478d-aefc-5e63513a87b4"/>
@@ -5489,15 +5543,6 @@
 </ct:contentTypeSchema>
 </file>
 
-<file path=customXml/item2.xml><?xml version="1.0" encoding="utf-8"?>
-<?mso-contentType ?>
-<FormTemplates xmlns="http://schemas.microsoft.com/sharepoint/v3/contenttype/forms">
-  <Display>DocumentLibraryForm</Display>
-  <Edit>DocumentLibraryForm</Edit>
-  <New>DocumentLibraryForm</New>
-</FormTemplates>
-</file>
-
 <file path=customXml/item3.xml><?xml version="1.0" encoding="utf-8"?>
 <p:properties xmlns:p="http://schemas.microsoft.com/office/2006/metadata/properties" xmlns:xsi="http://www.w3.org/2001/XMLSchema-instance" xmlns:pc="http://schemas.microsoft.com/office/infopath/2007/PartnerControls">
   <documentManagement/>
@@ -5505,6 +5550,14 @@
 </file>
 
 <file path=customXml/itemProps1.xml><?xml version="1.0" encoding="utf-8"?>
+<ds:datastoreItem xmlns:ds="http://schemas.openxmlformats.org/officeDocument/2006/customXml" ds:itemID="{FB3C2730-0377-47B6-8B4E-F18BBA759BBC}">
+  <ds:schemaRefs>
+    <ds:schemaRef ds:uri="http://schemas.microsoft.com/sharepoint/v3/contenttype/forms"/>
+  </ds:schemaRefs>
+</ds:datastoreItem>
+</file>
+
+<file path=customXml/itemProps2.xml><?xml version="1.0" encoding="utf-8"?>
 <ds:datastoreItem xmlns:ds="http://schemas.openxmlformats.org/officeDocument/2006/customXml" ds:itemID="{C02B9492-F3CE-4FF8-82A9-87DD4C5C38B3}">
   <ds:schemaRefs>
     <ds:schemaRef ds:uri="http://schemas.microsoft.com/office/2006/metadata/contentType"/>
@@ -5519,14 +5572,6 @@
     <ds:schemaRef ds:uri="http://purl.org/dc/elements/1.1/"/>
     <ds:schemaRef ds:uri="http://purl.org/dc/terms/"/>
     <ds:schemaRef ds:uri="http://schemas.microsoft.com/internal/obd"/>
-  </ds:schemaRefs>
-</ds:datastoreItem>
-</file>
-
-<file path=customXml/itemProps2.xml><?xml version="1.0" encoding="utf-8"?>
-<ds:datastoreItem xmlns:ds="http://schemas.openxmlformats.org/officeDocument/2006/customXml" ds:itemID="{FB3C2730-0377-47B6-8B4E-F18BBA759BBC}">
-  <ds:schemaRefs>
-    <ds:schemaRef ds:uri="http://schemas.microsoft.com/sharepoint/v3/contenttype/forms"/>
   </ds:schemaRefs>
 </ds:datastoreItem>
 </file>

</xml_diff>

<commit_message>
Modelo proto persona no user Stories
</commit_message>
<xml_diff>
--- a/Ideação/Requisitos/User Stories.pptx
+++ b/Ideação/Requisitos/User Stories.pptx
@@ -8,6 +8,7 @@
     <p:sldId id="256" r:id="rId5"/>
     <p:sldId id="257" r:id="rId6"/>
     <p:sldId id="258" r:id="rId7"/>
+    <p:sldId id="259" r:id="rId8"/>
   </p:sldIdLst>
   <p:sldSz cx="12192000" cy="6858000"/>
   <p:notesSz cx="6858000" cy="9144000"/>
@@ -261,7 +262,7 @@
           <a:p>
             <a:fld id="{FF510886-C572-4804-8F43-1CB06F629938}" type="datetimeFigureOut">
               <a:rPr lang="pt-BR" smtClean="0"/>
-              <a:t>19/04/2022</a:t>
+              <a:t>25/04/2022</a:t>
             </a:fld>
             <a:endParaRPr lang="pt-BR"/>
           </a:p>
@@ -459,7 +460,7 @@
           <a:p>
             <a:fld id="{FF510886-C572-4804-8F43-1CB06F629938}" type="datetimeFigureOut">
               <a:rPr lang="pt-BR" smtClean="0"/>
-              <a:t>19/04/2022</a:t>
+              <a:t>25/04/2022</a:t>
             </a:fld>
             <a:endParaRPr lang="pt-BR"/>
           </a:p>
@@ -667,7 +668,7 @@
           <a:p>
             <a:fld id="{FF510886-C572-4804-8F43-1CB06F629938}" type="datetimeFigureOut">
               <a:rPr lang="pt-BR" smtClean="0"/>
-              <a:t>19/04/2022</a:t>
+              <a:t>25/04/2022</a:t>
             </a:fld>
             <a:endParaRPr lang="pt-BR"/>
           </a:p>
@@ -865,7 +866,7 @@
           <a:p>
             <a:fld id="{FF510886-C572-4804-8F43-1CB06F629938}" type="datetimeFigureOut">
               <a:rPr lang="pt-BR" smtClean="0"/>
-              <a:t>19/04/2022</a:t>
+              <a:t>25/04/2022</a:t>
             </a:fld>
             <a:endParaRPr lang="pt-BR"/>
           </a:p>
@@ -1140,7 +1141,7 @@
           <a:p>
             <a:fld id="{FF510886-C572-4804-8F43-1CB06F629938}" type="datetimeFigureOut">
               <a:rPr lang="pt-BR" smtClean="0"/>
-              <a:t>19/04/2022</a:t>
+              <a:t>25/04/2022</a:t>
             </a:fld>
             <a:endParaRPr lang="pt-BR"/>
           </a:p>
@@ -1405,7 +1406,7 @@
           <a:p>
             <a:fld id="{FF510886-C572-4804-8F43-1CB06F629938}" type="datetimeFigureOut">
               <a:rPr lang="pt-BR" smtClean="0"/>
-              <a:t>19/04/2022</a:t>
+              <a:t>25/04/2022</a:t>
             </a:fld>
             <a:endParaRPr lang="pt-BR"/>
           </a:p>
@@ -1817,7 +1818,7 @@
           <a:p>
             <a:fld id="{FF510886-C572-4804-8F43-1CB06F629938}" type="datetimeFigureOut">
               <a:rPr lang="pt-BR" smtClean="0"/>
-              <a:t>19/04/2022</a:t>
+              <a:t>25/04/2022</a:t>
             </a:fld>
             <a:endParaRPr lang="pt-BR"/>
           </a:p>
@@ -1958,7 +1959,7 @@
           <a:p>
             <a:fld id="{FF510886-C572-4804-8F43-1CB06F629938}" type="datetimeFigureOut">
               <a:rPr lang="pt-BR" smtClean="0"/>
-              <a:t>19/04/2022</a:t>
+              <a:t>25/04/2022</a:t>
             </a:fld>
             <a:endParaRPr lang="pt-BR"/>
           </a:p>
@@ -2071,7 +2072,7 @@
           <a:p>
             <a:fld id="{FF510886-C572-4804-8F43-1CB06F629938}" type="datetimeFigureOut">
               <a:rPr lang="pt-BR" smtClean="0"/>
-              <a:t>19/04/2022</a:t>
+              <a:t>25/04/2022</a:t>
             </a:fld>
             <a:endParaRPr lang="pt-BR"/>
           </a:p>
@@ -2382,7 +2383,7 @@
           <a:p>
             <a:fld id="{FF510886-C572-4804-8F43-1CB06F629938}" type="datetimeFigureOut">
               <a:rPr lang="pt-BR" smtClean="0"/>
-              <a:t>19/04/2022</a:t>
+              <a:t>25/04/2022</a:t>
             </a:fld>
             <a:endParaRPr lang="pt-BR"/>
           </a:p>
@@ -2670,7 +2671,7 @@
           <a:p>
             <a:fld id="{FF510886-C572-4804-8F43-1CB06F629938}" type="datetimeFigureOut">
               <a:rPr lang="pt-BR" smtClean="0"/>
-              <a:t>19/04/2022</a:t>
+              <a:t>25/04/2022</a:t>
             </a:fld>
             <a:endParaRPr lang="pt-BR"/>
           </a:p>
@@ -2911,7 +2912,7 @@
           <a:p>
             <a:fld id="{FF510886-C572-4804-8F43-1CB06F629938}" type="datetimeFigureOut">
               <a:rPr lang="pt-BR" smtClean="0"/>
-              <a:t>19/04/2022</a:t>
+              <a:t>25/04/2022</a:t>
             </a:fld>
             <a:endParaRPr lang="pt-BR"/>
           </a:p>
@@ -4312,10 +4313,10 @@
       </p:sp>
       <p:sp>
         <p:nvSpPr>
-          <p:cNvPr id="10" name="Retângulo: Cantos Arredondados 9">
-            <a:extLst>
-              <a:ext uri="{FF2B5EF4-FFF2-40B4-BE49-F238E27FC236}">
-                <a16:creationId xmlns:a16="http://schemas.microsoft.com/office/drawing/2014/main" id="{F6AA62DE-8289-4489-93B5-44173FDC1D7B}"/>
+          <p:cNvPr id="11" name="Retângulo: Cantos Arredondados 10">
+            <a:extLst>
+              <a:ext uri="{FF2B5EF4-FFF2-40B4-BE49-F238E27FC236}">
+                <a16:creationId xmlns:a16="http://schemas.microsoft.com/office/drawing/2014/main" id="{51A34366-0D07-44AA-972D-23D7C44EB36D}"/>
               </a:ext>
             </a:extLst>
           </p:cNvPr>
@@ -4324,7 +4325,7 @@
         </p:nvSpPr>
         <p:spPr>
           <a:xfrm>
-            <a:off x="4675492" y="2951412"/>
+            <a:off x="4713508" y="2951411"/>
             <a:ext cx="3487062" cy="2316327"/>
           </a:xfrm>
           <a:prstGeom prst="roundRect">
@@ -4378,7 +4379,7 @@
             </a:r>
           </a:p>
           <a:p>
-            <a:pPr marL="285750" indent="-285750" algn="ctr">
+            <a:pPr marL="285750" indent="-285750">
               <a:buFont typeface="Arial" panose="020B0604020202020204" pitchFamily="34" charset="0"/>
               <a:buChar char="•"/>
             </a:pPr>
@@ -4390,7 +4391,26 @@
                 <a:effectLst/>
                 <a:latin typeface="Calibri" panose="020F0502020204030204" pitchFamily="34" charset="0"/>
               </a:rPr>
-              <a:t>Eu como suporte, necessito de uma descrição mais detalhada do problema para encontrar uma solução de forma mais rápida e eficiente.</a:t>
+              <a:t>Eu como </a:t>
+            </a:r>
+            <a:r>
+              <a:rPr lang="pt-BR" dirty="0">
+                <a:solidFill>
+                  <a:srgbClr val="000000"/>
+                </a:solidFill>
+                <a:latin typeface="Calibri" panose="020F0502020204030204" pitchFamily="34" charset="0"/>
+              </a:rPr>
+              <a:t>administrador </a:t>
+            </a:r>
+            <a:r>
+              <a:rPr lang="pt-BR" b="0" i="0" dirty="0">
+                <a:solidFill>
+                  <a:srgbClr val="000000"/>
+                </a:solidFill>
+                <a:effectLst/>
+                <a:latin typeface="Calibri" panose="020F0502020204030204" pitchFamily="34" charset="0"/>
+              </a:rPr>
+              <a:t>preciso de uma lista simples de quantidade de transações e lucro líquido por estação para criar um relatório para meus superiores.</a:t>
             </a:r>
             <a:endParaRPr lang="pt-BR" dirty="0">
               <a:solidFill>
@@ -4399,14 +4419,26 @@
               <a:latin typeface="Comic Sans MS" panose="030F0702030302020204" pitchFamily="66" charset="0"/>
             </a:endParaRPr>
           </a:p>
-        </p:txBody>
-      </p:sp>
-      <p:sp>
-        <p:nvSpPr>
-          <p:cNvPr id="11" name="Retângulo: Cantos Arredondados 10">
-            <a:extLst>
-              <a:ext uri="{FF2B5EF4-FFF2-40B4-BE49-F238E27FC236}">
-                <a16:creationId xmlns:a16="http://schemas.microsoft.com/office/drawing/2014/main" id="{51A34366-0D07-44AA-972D-23D7C44EB36D}"/>
+          <a:p>
+            <a:pPr marL="285750" indent="-285750">
+              <a:buFont typeface="Arial" panose="020B0604020202020204" pitchFamily="34" charset="0"/>
+              <a:buChar char="•"/>
+            </a:pPr>
+            <a:endParaRPr lang="pt-BR" dirty="0">
+              <a:solidFill>
+                <a:schemeClr val="tx1"/>
+              </a:solidFill>
+              <a:latin typeface="Comic Sans MS" panose="030F0702030302020204" pitchFamily="66" charset="0"/>
+            </a:endParaRPr>
+          </a:p>
+        </p:txBody>
+      </p:sp>
+      <p:sp>
+        <p:nvSpPr>
+          <p:cNvPr id="8" name="Retângulo: Cantos Arredondados 7">
+            <a:extLst>
+              <a:ext uri="{FF2B5EF4-FFF2-40B4-BE49-F238E27FC236}">
+                <a16:creationId xmlns:a16="http://schemas.microsoft.com/office/drawing/2014/main" id="{231D25F4-2E65-45BF-88B9-328D3DB19D62}"/>
               </a:ext>
             </a:extLst>
           </p:cNvPr>
@@ -4415,8 +4447,8 @@
         </p:nvSpPr>
         <p:spPr>
           <a:xfrm>
-            <a:off x="8462299" y="2951412"/>
-            <a:ext cx="3487062" cy="2316327"/>
+            <a:off x="8401714" y="2951411"/>
+            <a:ext cx="3646090" cy="2316327"/>
           </a:xfrm>
           <a:prstGeom prst="roundRect">
             <a:avLst/>
@@ -4469,7 +4501,7 @@
             </a:r>
           </a:p>
           <a:p>
-            <a:pPr marL="285750" indent="-285750" algn="ctr">
+            <a:pPr marL="285750" indent="-285750">
               <a:buFont typeface="Arial" panose="020B0604020202020204" pitchFamily="34" charset="0"/>
               <a:buChar char="•"/>
             </a:pPr>
@@ -4481,28 +4513,20 @@
                 <a:effectLst/>
                 <a:latin typeface="Calibri" panose="020F0502020204030204" pitchFamily="34" charset="0"/>
               </a:rPr>
-              <a:t>Eu como usuário do totem, necessito de uma confirmação por </a:t>
-            </a:r>
-            <a:r>
-              <a:rPr lang="pt-BR" b="0" i="0" dirty="0" err="1">
-                <a:solidFill>
-                  <a:srgbClr val="000000"/>
-                </a:solidFill>
-                <a:effectLst/>
-                <a:latin typeface="Calibri" panose="020F0502020204030204" pitchFamily="34" charset="0"/>
-              </a:rPr>
-              <a:t>whatsapp</a:t>
-            </a:r>
-            <a:r>
-              <a:rPr lang="pt-BR" b="0" i="0" dirty="0">
-                <a:solidFill>
-                  <a:srgbClr val="000000"/>
-                </a:solidFill>
-                <a:effectLst/>
-                <a:latin typeface="Calibri" panose="020F0502020204030204" pitchFamily="34" charset="0"/>
-              </a:rPr>
-              <a:t> ou SMS para saber se a minha compra ou recarga do bilhete foi efetuada com sucesso.</a:t>
-            </a:r>
+              <a:t>Eu como suporte, necessito de uma documentação ou manual de registro de soluções posteriores por outros colaboradores, para ter um guia padronizado do que fazer em determinadas situações</a:t>
+            </a:r>
+            <a:endParaRPr lang="pt-BR" dirty="0">
+              <a:solidFill>
+                <a:schemeClr val="tx1"/>
+              </a:solidFill>
+              <a:latin typeface="Comic Sans MS" panose="030F0702030302020204" pitchFamily="66" charset="0"/>
+            </a:endParaRPr>
+          </a:p>
+          <a:p>
+            <a:pPr marL="285750" indent="-285750">
+              <a:buFont typeface="Arial" panose="020B0604020202020204" pitchFamily="34" charset="0"/>
+              <a:buChar char="•"/>
+            </a:pPr>
             <a:endParaRPr lang="pt-BR" dirty="0">
               <a:solidFill>
                 <a:schemeClr val="tx1"/>
@@ -4544,10 +4568,10 @@
       </p:grpSpPr>
       <p:sp>
         <p:nvSpPr>
-          <p:cNvPr id="2" name="Retângulo: Cantos Arredondados 1">
-            <a:extLst>
-              <a:ext uri="{FF2B5EF4-FFF2-40B4-BE49-F238E27FC236}">
-                <a16:creationId xmlns:a16="http://schemas.microsoft.com/office/drawing/2014/main" id="{3B887D0C-64A4-4E35-9C2B-B531B4F9C578}"/>
+          <p:cNvPr id="3" name="Retângulo: Cantos Arredondados 2">
+            <a:extLst>
+              <a:ext uri="{FF2B5EF4-FFF2-40B4-BE49-F238E27FC236}">
+                <a16:creationId xmlns:a16="http://schemas.microsoft.com/office/drawing/2014/main" id="{FAB38A0B-6D3A-4760-91E8-2950B7454A65}"/>
               </a:ext>
             </a:extLst>
           </p:cNvPr>
@@ -4556,8 +4580,8 @@
         </p:nvSpPr>
         <p:spPr>
           <a:xfrm>
-            <a:off x="242638" y="241342"/>
-            <a:ext cx="3425690" cy="2316327"/>
+            <a:off x="478648" y="411707"/>
+            <a:ext cx="4080099" cy="2835076"/>
           </a:xfrm>
           <a:prstGeom prst="roundRect">
             <a:avLst/>
@@ -4610,7 +4634,7 @@
             </a:r>
           </a:p>
           <a:p>
-            <a:pPr marL="285750" indent="-285750" algn="ctr">
+            <a:pPr marL="285750" indent="-285750">
               <a:buFont typeface="Arial" panose="020B0604020202020204" pitchFamily="34" charset="0"/>
               <a:buChar char="•"/>
             </a:pPr>
@@ -4622,26 +4646,7 @@
                 <a:effectLst/>
                 <a:latin typeface="Calibri" panose="020F0502020204030204" pitchFamily="34" charset="0"/>
               </a:rPr>
-              <a:t>Eu como </a:t>
-            </a:r>
-            <a:r>
-              <a:rPr lang="pt-BR" dirty="0">
-                <a:solidFill>
-                  <a:srgbClr val="000000"/>
-                </a:solidFill>
-                <a:latin typeface="Calibri" panose="020F0502020204030204" pitchFamily="34" charset="0"/>
-              </a:rPr>
-              <a:t>administrador </a:t>
-            </a:r>
-            <a:r>
-              <a:rPr lang="pt-BR" b="0" i="0" dirty="0">
-                <a:solidFill>
-                  <a:srgbClr val="000000"/>
-                </a:solidFill>
-                <a:effectLst/>
-                <a:latin typeface="Calibri" panose="020F0502020204030204" pitchFamily="34" charset="0"/>
-              </a:rPr>
-              <a:t>preciso de uma lista simples de quantidade de transações e lucro líquido por estação para criar um relatório para meus superiores.</a:t>
+              <a:t>Eu como administração necessito de um relatório com o histórico de totem para conseguir ter uma tomada de decisão mais precisa, conseguir fazer a administração financeira da empresa e gerar relatórios sobre eles.</a:t>
             </a:r>
             <a:endParaRPr lang="pt-BR" dirty="0">
               <a:solidFill>
@@ -4650,90 +4655,7 @@
               <a:latin typeface="Comic Sans MS" panose="030F0702030302020204" pitchFamily="66" charset="0"/>
             </a:endParaRPr>
           </a:p>
-        </p:txBody>
-      </p:sp>
-      <p:sp>
-        <p:nvSpPr>
-          <p:cNvPr id="3" name="Retângulo: Cantos Arredondados 2">
-            <a:extLst>
-              <a:ext uri="{FF2B5EF4-FFF2-40B4-BE49-F238E27FC236}">
-                <a16:creationId xmlns:a16="http://schemas.microsoft.com/office/drawing/2014/main" id="{FAB38A0B-6D3A-4760-91E8-2950B7454A65}"/>
-              </a:ext>
-            </a:extLst>
-          </p:cNvPr>
-          <p:cNvSpPr/>
-          <p:nvPr/>
-        </p:nvSpPr>
-        <p:spPr>
-          <a:xfrm>
-            <a:off x="3888728" y="212925"/>
-            <a:ext cx="3920116" cy="2316327"/>
-          </a:xfrm>
-          <a:prstGeom prst="roundRect">
-            <a:avLst/>
-          </a:prstGeom>
-          <a:solidFill>
-            <a:schemeClr val="bg1"/>
-          </a:solidFill>
-          <a:ln w="38100">
-            <a:solidFill>
-              <a:srgbClr val="37A8E9"/>
-            </a:solidFill>
-          </a:ln>
-        </p:spPr>
-        <p:style>
-          <a:lnRef idx="2">
-            <a:schemeClr val="accent1">
-              <a:shade val="50000"/>
-            </a:schemeClr>
-          </a:lnRef>
-          <a:fillRef idx="1">
-            <a:schemeClr val="accent1"/>
-          </a:fillRef>
-          <a:effectRef idx="0">
-            <a:schemeClr val="accent1"/>
-          </a:effectRef>
-          <a:fontRef idx="minor">
-            <a:schemeClr val="lt1"/>
-          </a:fontRef>
-        </p:style>
-        <p:txBody>
-          <a:bodyPr rtlCol="0" anchor="ctr"/>
-          <a:lstStyle/>
-          <a:p>
-            <a:pPr algn="ctr"/>
-            <a:endParaRPr lang="pt-BR" dirty="0">
-              <a:solidFill>
-                <a:schemeClr val="tx1"/>
-              </a:solidFill>
-            </a:endParaRPr>
-          </a:p>
-          <a:p>
-            <a:r>
-              <a:rPr lang="pt-BR" dirty="0">
-                <a:solidFill>
-                  <a:schemeClr val="tx1"/>
-                </a:solidFill>
-                <a:latin typeface="Comic Sans MS" panose="030F0702030302020204" pitchFamily="66" charset="0"/>
-              </a:rPr>
-              <a:t>#14</a:t>
-            </a:r>
-          </a:p>
-          <a:p>
-            <a:pPr marL="285750" indent="-285750" algn="ctr">
-              <a:buFont typeface="Arial" panose="020B0604020202020204" pitchFamily="34" charset="0"/>
-              <a:buChar char="•"/>
-            </a:pPr>
-            <a:r>
-              <a:rPr lang="pt-BR" b="0" i="0" dirty="0">
-                <a:solidFill>
-                  <a:srgbClr val="000000"/>
-                </a:solidFill>
-                <a:effectLst/>
-                <a:latin typeface="Calibri" panose="020F0502020204030204" pitchFamily="34" charset="0"/>
-              </a:rPr>
-              <a:t>Eu como suporte, necessito de uma documentação ou manual de registro de soluções posteriores por outros colaboradores, para ter um guia padronizado do que fazer em determinadas situações</a:t>
-            </a:r>
+          <a:p>
             <a:endParaRPr lang="pt-BR" dirty="0">
               <a:solidFill>
                 <a:schemeClr val="tx1"/>
@@ -4743,308 +4665,529 @@
           </a:p>
         </p:txBody>
       </p:sp>
-      <p:sp>
-        <p:nvSpPr>
-          <p:cNvPr id="6" name="Retângulo: Cantos Arredondados 5">
-            <a:extLst>
-              <a:ext uri="{FF2B5EF4-FFF2-40B4-BE49-F238E27FC236}">
-                <a16:creationId xmlns:a16="http://schemas.microsoft.com/office/drawing/2014/main" id="{A1781199-8B3D-4B68-932D-B35A37918984}"/>
-              </a:ext>
-            </a:extLst>
-          </p:cNvPr>
-          <p:cNvSpPr/>
-          <p:nvPr/>
-        </p:nvSpPr>
-        <p:spPr>
-          <a:xfrm>
-            <a:off x="8029245" y="212925"/>
-            <a:ext cx="3920116" cy="2541615"/>
-          </a:xfrm>
-          <a:prstGeom prst="roundRect">
-            <a:avLst/>
-          </a:prstGeom>
-          <a:solidFill>
-            <a:schemeClr val="bg1"/>
-          </a:solidFill>
-          <a:ln w="38100">
-            <a:solidFill>
-              <a:srgbClr val="37A8E9"/>
-            </a:solidFill>
-          </a:ln>
-        </p:spPr>
-        <p:style>
-          <a:lnRef idx="2">
-            <a:schemeClr val="accent1">
-              <a:shade val="50000"/>
-            </a:schemeClr>
-          </a:lnRef>
-          <a:fillRef idx="1">
-            <a:schemeClr val="accent1"/>
-          </a:fillRef>
-          <a:effectRef idx="0">
-            <a:schemeClr val="accent1"/>
-          </a:effectRef>
-          <a:fontRef idx="minor">
-            <a:schemeClr val="lt1"/>
-          </a:fontRef>
-        </p:style>
-        <p:txBody>
-          <a:bodyPr rtlCol="0" anchor="ctr"/>
-          <a:lstStyle/>
-          <a:p>
-            <a:pPr algn="ctr"/>
-            <a:endParaRPr lang="pt-BR" dirty="0">
-              <a:solidFill>
-                <a:schemeClr val="tx1"/>
-              </a:solidFill>
-            </a:endParaRPr>
-          </a:p>
-          <a:p>
-            <a:r>
-              <a:rPr lang="pt-BR" dirty="0">
-                <a:solidFill>
-                  <a:schemeClr val="tx1"/>
-                </a:solidFill>
-                <a:latin typeface="Comic Sans MS" panose="030F0702030302020204" pitchFamily="66" charset="0"/>
-              </a:rPr>
-              <a:t>#15</a:t>
-            </a:r>
-          </a:p>
-          <a:p>
-            <a:pPr marL="285750" indent="-285750" algn="ctr">
-              <a:buFont typeface="Arial" panose="020B0604020202020204" pitchFamily="34" charset="0"/>
-              <a:buChar char="•"/>
-            </a:pPr>
-            <a:r>
-              <a:rPr lang="pt-BR" b="0" i="0" dirty="0">
-                <a:solidFill>
-                  <a:srgbClr val="000000"/>
-                </a:solidFill>
-                <a:effectLst/>
-                <a:latin typeface="Calibri" panose="020F0502020204030204" pitchFamily="34" charset="0"/>
-              </a:rPr>
-              <a:t>eu como administração necessito de um relatório com o histórico de totem para conseguir ter uma tomada de decisão mais precisa, conseguir fazer a administração financeira da empresa e gerar relatórios sobre eles.</a:t>
-            </a:r>
-            <a:endParaRPr lang="pt-BR" dirty="0">
-              <a:solidFill>
-                <a:schemeClr val="tx1"/>
-              </a:solidFill>
-              <a:latin typeface="Comic Sans MS" panose="030F0702030302020204" pitchFamily="66" charset="0"/>
-            </a:endParaRPr>
-          </a:p>
-        </p:txBody>
-      </p:sp>
-      <p:sp>
-        <p:nvSpPr>
-          <p:cNvPr id="9" name="Retângulo: Cantos Arredondados 8">
-            <a:extLst>
-              <a:ext uri="{FF2B5EF4-FFF2-40B4-BE49-F238E27FC236}">
-                <a16:creationId xmlns:a16="http://schemas.microsoft.com/office/drawing/2014/main" id="{E8FC0A76-EF25-420E-B923-570D30D03D62}"/>
-              </a:ext>
-            </a:extLst>
-          </p:cNvPr>
-          <p:cNvSpPr/>
-          <p:nvPr/>
-        </p:nvSpPr>
-        <p:spPr>
-          <a:xfrm>
-            <a:off x="242639" y="2951413"/>
-            <a:ext cx="4137203" cy="2316327"/>
-          </a:xfrm>
-          <a:prstGeom prst="roundRect">
-            <a:avLst/>
-          </a:prstGeom>
-          <a:solidFill>
-            <a:schemeClr val="bg1"/>
-          </a:solidFill>
-          <a:ln w="38100">
-            <a:solidFill>
-              <a:srgbClr val="37A8E9"/>
-            </a:solidFill>
-          </a:ln>
-        </p:spPr>
-        <p:style>
-          <a:lnRef idx="2">
-            <a:schemeClr val="accent1">
-              <a:shade val="50000"/>
-            </a:schemeClr>
-          </a:lnRef>
-          <a:fillRef idx="1">
-            <a:schemeClr val="accent1"/>
-          </a:fillRef>
-          <a:effectRef idx="0">
-            <a:schemeClr val="accent1"/>
-          </a:effectRef>
-          <a:fontRef idx="minor">
-            <a:schemeClr val="lt1"/>
-          </a:fontRef>
-        </p:style>
-        <p:txBody>
-          <a:bodyPr rtlCol="0" anchor="ctr"/>
-          <a:lstStyle/>
-          <a:p>
-            <a:pPr algn="ctr"/>
-            <a:endParaRPr lang="pt-BR" dirty="0">
-              <a:solidFill>
-                <a:schemeClr val="tx1"/>
-              </a:solidFill>
-            </a:endParaRPr>
-          </a:p>
-          <a:p>
-            <a:r>
-              <a:rPr lang="pt-BR" dirty="0">
-                <a:solidFill>
-                  <a:schemeClr val="tx1"/>
-                </a:solidFill>
-                <a:latin typeface="Comic Sans MS" panose="030F0702030302020204" pitchFamily="66" charset="0"/>
-              </a:rPr>
-              <a:t>#</a:t>
-            </a:r>
-          </a:p>
-        </p:txBody>
-      </p:sp>
-      <p:sp>
-        <p:nvSpPr>
-          <p:cNvPr id="10" name="Retângulo: Cantos Arredondados 9">
-            <a:extLst>
-              <a:ext uri="{FF2B5EF4-FFF2-40B4-BE49-F238E27FC236}">
-                <a16:creationId xmlns:a16="http://schemas.microsoft.com/office/drawing/2014/main" id="{F6AA62DE-8289-4489-93B5-44173FDC1D7B}"/>
-              </a:ext>
-            </a:extLst>
-          </p:cNvPr>
-          <p:cNvSpPr/>
-          <p:nvPr/>
-        </p:nvSpPr>
-        <p:spPr>
-          <a:xfrm>
-            <a:off x="4675492" y="2951412"/>
-            <a:ext cx="3395082" cy="2316327"/>
-          </a:xfrm>
-          <a:prstGeom prst="roundRect">
-            <a:avLst/>
-          </a:prstGeom>
-          <a:solidFill>
-            <a:schemeClr val="bg1"/>
-          </a:solidFill>
-          <a:ln w="38100">
-            <a:solidFill>
-              <a:srgbClr val="37A8E9"/>
-            </a:solidFill>
-          </a:ln>
-        </p:spPr>
-        <p:style>
-          <a:lnRef idx="2">
-            <a:schemeClr val="accent1">
-              <a:shade val="50000"/>
-            </a:schemeClr>
-          </a:lnRef>
-          <a:fillRef idx="1">
-            <a:schemeClr val="accent1"/>
-          </a:fillRef>
-          <a:effectRef idx="0">
-            <a:schemeClr val="accent1"/>
-          </a:effectRef>
-          <a:fontRef idx="minor">
-            <a:schemeClr val="lt1"/>
-          </a:fontRef>
-        </p:style>
-        <p:txBody>
-          <a:bodyPr rtlCol="0" anchor="ctr"/>
-          <a:lstStyle/>
-          <a:p>
-            <a:pPr algn="ctr"/>
-            <a:endParaRPr lang="pt-BR" dirty="0">
-              <a:solidFill>
-                <a:schemeClr val="tx1"/>
-              </a:solidFill>
-            </a:endParaRPr>
-          </a:p>
-          <a:p>
-            <a:r>
-              <a:rPr lang="pt-BR" dirty="0">
-                <a:solidFill>
-                  <a:schemeClr val="tx1"/>
-                </a:solidFill>
-                <a:latin typeface="Comic Sans MS" panose="030F0702030302020204" pitchFamily="66" charset="0"/>
-              </a:rPr>
-              <a:t>#</a:t>
-            </a:r>
-          </a:p>
-        </p:txBody>
-      </p:sp>
-      <p:sp>
-        <p:nvSpPr>
-          <p:cNvPr id="11" name="Retângulo: Cantos Arredondados 10">
-            <a:extLst>
-              <a:ext uri="{FF2B5EF4-FFF2-40B4-BE49-F238E27FC236}">
-                <a16:creationId xmlns:a16="http://schemas.microsoft.com/office/drawing/2014/main" id="{51A34366-0D07-44AA-972D-23D7C44EB36D}"/>
-              </a:ext>
-            </a:extLst>
-          </p:cNvPr>
-          <p:cNvSpPr/>
-          <p:nvPr/>
-        </p:nvSpPr>
-        <p:spPr>
-          <a:xfrm>
-            <a:off x="8462299" y="2951412"/>
-            <a:ext cx="3487062" cy="2316327"/>
-          </a:xfrm>
-          <a:prstGeom prst="roundRect">
-            <a:avLst/>
-          </a:prstGeom>
-          <a:solidFill>
-            <a:schemeClr val="bg1"/>
-          </a:solidFill>
-          <a:ln w="38100">
-            <a:solidFill>
-              <a:srgbClr val="37A8E9"/>
-            </a:solidFill>
-          </a:ln>
-        </p:spPr>
-        <p:style>
-          <a:lnRef idx="2">
-            <a:schemeClr val="accent1">
-              <a:shade val="50000"/>
-            </a:schemeClr>
-          </a:lnRef>
-          <a:fillRef idx="1">
-            <a:schemeClr val="accent1"/>
-          </a:fillRef>
-          <a:effectRef idx="0">
-            <a:schemeClr val="accent1"/>
-          </a:effectRef>
-          <a:fontRef idx="minor">
-            <a:schemeClr val="lt1"/>
-          </a:fontRef>
-        </p:style>
-        <p:txBody>
-          <a:bodyPr rtlCol="0" anchor="ctr"/>
-          <a:lstStyle/>
-          <a:p>
-            <a:pPr algn="ctr"/>
-            <a:endParaRPr lang="pt-BR" dirty="0">
-              <a:solidFill>
-                <a:schemeClr val="tx1"/>
-              </a:solidFill>
-            </a:endParaRPr>
-          </a:p>
-          <a:p>
-            <a:r>
-              <a:rPr lang="pt-BR" dirty="0">
-                <a:solidFill>
-                  <a:schemeClr val="tx1"/>
-                </a:solidFill>
-                <a:latin typeface="Comic Sans MS" panose="030F0702030302020204" pitchFamily="66" charset="0"/>
-              </a:rPr>
-              <a:t>#</a:t>
-            </a:r>
-          </a:p>
-        </p:txBody>
-      </p:sp>
     </p:spTree>
     <p:extLst>
       <p:ext uri="{BB962C8B-B14F-4D97-AF65-F5344CB8AC3E}">
         <p14:creationId xmlns:p14="http://schemas.microsoft.com/office/powerpoint/2010/main" val="2885614566"/>
+      </p:ext>
+    </p:extLst>
+  </p:cSld>
+  <p:clrMapOvr>
+    <a:masterClrMapping/>
+  </p:clrMapOvr>
+</p:sld>
+</file>
+
+<file path=ppt/slides/slide4.xml><?xml version="1.0" encoding="utf-8"?>
+<p:sld xmlns:a="http://schemas.openxmlformats.org/drawingml/2006/main" xmlns:r="http://schemas.openxmlformats.org/officeDocument/2006/relationships" xmlns:p="http://schemas.openxmlformats.org/presentationml/2006/main">
+  <p:cSld>
+    <p:spTree>
+      <p:nvGrpSpPr>
+        <p:cNvPr id="1" name=""/>
+        <p:cNvGrpSpPr/>
+        <p:nvPr/>
+      </p:nvGrpSpPr>
+      <p:grpSpPr>
+        <a:xfrm>
+          <a:off x="0" y="0"/>
+          <a:ext cx="0" cy="0"/>
+          <a:chOff x="0" y="0"/>
+          <a:chExt cx="0" cy="0"/>
+        </a:xfrm>
+      </p:grpSpPr>
+      <p:grpSp>
+        <p:nvGrpSpPr>
+          <p:cNvPr id="13" name="Agrupar 12">
+            <a:extLst>
+              <a:ext uri="{FF2B5EF4-FFF2-40B4-BE49-F238E27FC236}">
+                <a16:creationId xmlns:a16="http://schemas.microsoft.com/office/drawing/2014/main" id="{37518CB9-97FF-401F-859D-17623CEBAEA9}"/>
+              </a:ext>
+            </a:extLst>
+          </p:cNvPr>
+          <p:cNvGrpSpPr/>
+          <p:nvPr/>
+        </p:nvGrpSpPr>
+        <p:grpSpPr>
+          <a:xfrm>
+            <a:off x="132521" y="1090246"/>
+            <a:ext cx="12192000" cy="4677508"/>
+            <a:chOff x="0" y="1245630"/>
+            <a:chExt cx="12192000" cy="4677508"/>
+          </a:xfrm>
+        </p:grpSpPr>
+        <p:pic>
+          <p:nvPicPr>
+            <p:cNvPr id="3" name="Imagem 2" descr="Interface gráfica do usuário&#10;&#10;Descrição gerada automaticamente">
+              <a:extLst>
+                <a:ext uri="{FF2B5EF4-FFF2-40B4-BE49-F238E27FC236}">
+                  <a16:creationId xmlns:a16="http://schemas.microsoft.com/office/drawing/2014/main" id="{B49D91B2-F965-4CE7-A44E-9C1426A052B1}"/>
+                </a:ext>
+              </a:extLst>
+            </p:cNvPr>
+            <p:cNvPicPr>
+              <a:picLocks noChangeAspect="1"/>
+            </p:cNvPicPr>
+            <p:nvPr/>
+          </p:nvPicPr>
+          <p:blipFill rotWithShape="1">
+            <a:blip r:embed="rId2">
+              <a:extLst>
+                <a:ext uri="{28A0092B-C50C-407E-A947-70E740481C1C}">
+                  <a14:useLocalDpi xmlns:a14="http://schemas.microsoft.com/office/drawing/2010/main" val="0"/>
+                </a:ext>
+              </a:extLst>
+            </a:blip>
+            <a:srcRect l="423" t="31795" r="-423"/>
+            <a:stretch/>
+          </p:blipFill>
+          <p:spPr>
+            <a:xfrm>
+              <a:off x="0" y="1245630"/>
+              <a:ext cx="12192000" cy="4677508"/>
+            </a:xfrm>
+            <a:prstGeom prst="rect">
+              <a:avLst/>
+            </a:prstGeom>
+          </p:spPr>
+        </p:pic>
+        <p:grpSp>
+          <p:nvGrpSpPr>
+            <p:cNvPr id="12" name="Agrupar 11">
+              <a:extLst>
+                <a:ext uri="{FF2B5EF4-FFF2-40B4-BE49-F238E27FC236}">
+                  <a16:creationId xmlns:a16="http://schemas.microsoft.com/office/drawing/2014/main" id="{E0C0D382-B57C-4A83-B4A6-BB203A49120F}"/>
+                </a:ext>
+              </a:extLst>
+            </p:cNvPr>
+            <p:cNvGrpSpPr/>
+            <p:nvPr/>
+          </p:nvGrpSpPr>
+          <p:grpSpPr>
+            <a:xfrm>
+              <a:off x="590840" y="1371407"/>
+              <a:ext cx="11336117" cy="4364645"/>
+              <a:chOff x="590840" y="1371407"/>
+              <a:chExt cx="11336117" cy="4364645"/>
+            </a:xfrm>
+          </p:grpSpPr>
+          <p:sp>
+            <p:nvSpPr>
+              <p:cNvPr id="4" name="Retângulo 3">
+                <a:extLst>
+                  <a:ext uri="{FF2B5EF4-FFF2-40B4-BE49-F238E27FC236}">
+                    <a16:creationId xmlns:a16="http://schemas.microsoft.com/office/drawing/2014/main" id="{6B5CE567-C624-4229-B433-D418C7FA13BA}"/>
+                  </a:ext>
+                </a:extLst>
+              </p:cNvPr>
+              <p:cNvSpPr/>
+              <p:nvPr/>
+            </p:nvSpPr>
+            <p:spPr>
+              <a:xfrm>
+                <a:off x="590841" y="1503317"/>
+                <a:ext cx="1702191" cy="590843"/>
+              </a:xfrm>
+              <a:prstGeom prst="rect">
+                <a:avLst/>
+              </a:prstGeom>
+              <a:solidFill>
+                <a:srgbClr val="5271FF"/>
+              </a:solidFill>
+              <a:ln>
+                <a:solidFill>
+                  <a:srgbClr val="5271FF"/>
+                </a:solidFill>
+              </a:ln>
+            </p:spPr>
+            <p:style>
+              <a:lnRef idx="2">
+                <a:schemeClr val="accent1">
+                  <a:shade val="50000"/>
+                </a:schemeClr>
+              </a:lnRef>
+              <a:fillRef idx="1">
+                <a:schemeClr val="accent1"/>
+              </a:fillRef>
+              <a:effectRef idx="0">
+                <a:schemeClr val="accent1"/>
+              </a:effectRef>
+              <a:fontRef idx="minor">
+                <a:schemeClr val="lt1"/>
+              </a:fontRef>
+            </p:style>
+            <p:txBody>
+              <a:bodyPr rtlCol="0" anchor="ctr"/>
+              <a:lstStyle/>
+              <a:p>
+                <a:pPr algn="ctr"/>
+                <a:endParaRPr lang="pt-BR"/>
+              </a:p>
+            </p:txBody>
+          </p:sp>
+          <p:sp>
+            <p:nvSpPr>
+              <p:cNvPr id="5" name="Retângulo 4">
+                <a:extLst>
+                  <a:ext uri="{FF2B5EF4-FFF2-40B4-BE49-F238E27FC236}">
+                    <a16:creationId xmlns:a16="http://schemas.microsoft.com/office/drawing/2014/main" id="{00C71BFC-9029-4E42-A79E-4650BDB1CAA2}"/>
+                  </a:ext>
+                </a:extLst>
+              </p:cNvPr>
+              <p:cNvSpPr/>
+              <p:nvPr/>
+            </p:nvSpPr>
+            <p:spPr>
+              <a:xfrm>
+                <a:off x="590840" y="2753063"/>
+                <a:ext cx="1702191" cy="590843"/>
+              </a:xfrm>
+              <a:prstGeom prst="rect">
+                <a:avLst/>
+              </a:prstGeom>
+              <a:solidFill>
+                <a:srgbClr val="5271FF"/>
+              </a:solidFill>
+              <a:ln>
+                <a:solidFill>
+                  <a:srgbClr val="5271FF"/>
+                </a:solidFill>
+              </a:ln>
+            </p:spPr>
+            <p:style>
+              <a:lnRef idx="2">
+                <a:schemeClr val="accent1">
+                  <a:shade val="50000"/>
+                </a:schemeClr>
+              </a:lnRef>
+              <a:fillRef idx="1">
+                <a:schemeClr val="accent1"/>
+              </a:fillRef>
+              <a:effectRef idx="0">
+                <a:schemeClr val="accent1"/>
+              </a:effectRef>
+              <a:fontRef idx="minor">
+                <a:schemeClr val="lt1"/>
+              </a:fontRef>
+            </p:style>
+            <p:txBody>
+              <a:bodyPr rtlCol="0" anchor="ctr"/>
+              <a:lstStyle/>
+              <a:p>
+                <a:pPr algn="ctr"/>
+                <a:endParaRPr lang="pt-BR"/>
+              </a:p>
+            </p:txBody>
+          </p:sp>
+          <p:sp>
+            <p:nvSpPr>
+              <p:cNvPr id="6" name="Retângulo 5">
+                <a:extLst>
+                  <a:ext uri="{FF2B5EF4-FFF2-40B4-BE49-F238E27FC236}">
+                    <a16:creationId xmlns:a16="http://schemas.microsoft.com/office/drawing/2014/main" id="{CE29154D-0A5D-4B6F-8890-B04B88CDB6E0}"/>
+                  </a:ext>
+                </a:extLst>
+              </p:cNvPr>
+              <p:cNvSpPr/>
+              <p:nvPr/>
+            </p:nvSpPr>
+            <p:spPr>
+              <a:xfrm>
+                <a:off x="590842" y="3809515"/>
+                <a:ext cx="1702191" cy="590843"/>
+              </a:xfrm>
+              <a:prstGeom prst="rect">
+                <a:avLst/>
+              </a:prstGeom>
+              <a:solidFill>
+                <a:srgbClr val="5271FF"/>
+              </a:solidFill>
+              <a:ln>
+                <a:solidFill>
+                  <a:srgbClr val="5271FF"/>
+                </a:solidFill>
+              </a:ln>
+            </p:spPr>
+            <p:style>
+              <a:lnRef idx="2">
+                <a:schemeClr val="accent1">
+                  <a:shade val="50000"/>
+                </a:schemeClr>
+              </a:lnRef>
+              <a:fillRef idx="1">
+                <a:schemeClr val="accent1"/>
+              </a:fillRef>
+              <a:effectRef idx="0">
+                <a:schemeClr val="accent1"/>
+              </a:effectRef>
+              <a:fontRef idx="minor">
+                <a:schemeClr val="lt1"/>
+              </a:fontRef>
+            </p:style>
+            <p:txBody>
+              <a:bodyPr rtlCol="0" anchor="ctr"/>
+              <a:lstStyle/>
+              <a:p>
+                <a:pPr algn="ctr"/>
+                <a:endParaRPr lang="pt-BR"/>
+              </a:p>
+            </p:txBody>
+          </p:sp>
+          <p:sp>
+            <p:nvSpPr>
+              <p:cNvPr id="7" name="Retângulo 6">
+                <a:extLst>
+                  <a:ext uri="{FF2B5EF4-FFF2-40B4-BE49-F238E27FC236}">
+                    <a16:creationId xmlns:a16="http://schemas.microsoft.com/office/drawing/2014/main" id="{7014DE44-E9BD-428C-B986-EBD53A7510F5}"/>
+                  </a:ext>
+                </a:extLst>
+              </p:cNvPr>
+              <p:cNvSpPr/>
+              <p:nvPr/>
+            </p:nvSpPr>
+            <p:spPr>
+              <a:xfrm>
+                <a:off x="590841" y="5021527"/>
+                <a:ext cx="1702191" cy="590843"/>
+              </a:xfrm>
+              <a:prstGeom prst="rect">
+                <a:avLst/>
+              </a:prstGeom>
+              <a:solidFill>
+                <a:srgbClr val="5271FF"/>
+              </a:solidFill>
+              <a:ln>
+                <a:solidFill>
+                  <a:srgbClr val="5271FF"/>
+                </a:solidFill>
+              </a:ln>
+            </p:spPr>
+            <p:style>
+              <a:lnRef idx="2">
+                <a:schemeClr val="accent1">
+                  <a:shade val="50000"/>
+                </a:schemeClr>
+              </a:lnRef>
+              <a:fillRef idx="1">
+                <a:schemeClr val="accent1"/>
+              </a:fillRef>
+              <a:effectRef idx="0">
+                <a:schemeClr val="accent1"/>
+              </a:effectRef>
+              <a:fontRef idx="minor">
+                <a:schemeClr val="lt1"/>
+              </a:fontRef>
+            </p:style>
+            <p:txBody>
+              <a:bodyPr rtlCol="0" anchor="ctr"/>
+              <a:lstStyle/>
+              <a:p>
+                <a:pPr algn="ctr"/>
+                <a:endParaRPr lang="pt-BR"/>
+              </a:p>
+            </p:txBody>
+          </p:sp>
+          <p:sp>
+            <p:nvSpPr>
+              <p:cNvPr id="8" name="Retângulo 7">
+                <a:extLst>
+                  <a:ext uri="{FF2B5EF4-FFF2-40B4-BE49-F238E27FC236}">
+                    <a16:creationId xmlns:a16="http://schemas.microsoft.com/office/drawing/2014/main" id="{B4F80302-532D-48C5-B1D3-CC6B352355D6}"/>
+                  </a:ext>
+                </a:extLst>
+              </p:cNvPr>
+              <p:cNvSpPr/>
+              <p:nvPr/>
+            </p:nvSpPr>
+            <p:spPr>
+              <a:xfrm>
+                <a:off x="2955233" y="1371407"/>
+                <a:ext cx="8971722" cy="940904"/>
+              </a:xfrm>
+              <a:prstGeom prst="rect">
+                <a:avLst/>
+              </a:prstGeom>
+              <a:ln>
+                <a:solidFill>
+                  <a:schemeClr val="bg1"/>
+                </a:solidFill>
+              </a:ln>
+            </p:spPr>
+            <p:style>
+              <a:lnRef idx="2">
+                <a:schemeClr val="accent6"/>
+              </a:lnRef>
+              <a:fillRef idx="1">
+                <a:schemeClr val="lt1"/>
+              </a:fillRef>
+              <a:effectRef idx="0">
+                <a:schemeClr val="accent6"/>
+              </a:effectRef>
+              <a:fontRef idx="minor">
+                <a:schemeClr val="dk1"/>
+              </a:fontRef>
+            </p:style>
+            <p:txBody>
+              <a:bodyPr rtlCol="0" anchor="ctr"/>
+              <a:lstStyle/>
+              <a:p>
+                <a:pPr algn="ctr"/>
+                <a:endParaRPr lang="pt-BR"/>
+              </a:p>
+            </p:txBody>
+          </p:sp>
+          <p:sp>
+            <p:nvSpPr>
+              <p:cNvPr id="9" name="Retângulo 8">
+                <a:extLst>
+                  <a:ext uri="{FF2B5EF4-FFF2-40B4-BE49-F238E27FC236}">
+                    <a16:creationId xmlns:a16="http://schemas.microsoft.com/office/drawing/2014/main" id="{D0A1C7D6-151A-4565-B8C9-D532DBCC7A07}"/>
+                  </a:ext>
+                </a:extLst>
+              </p:cNvPr>
+              <p:cNvSpPr/>
+              <p:nvPr/>
+            </p:nvSpPr>
+            <p:spPr>
+              <a:xfrm>
+                <a:off x="2955235" y="2498721"/>
+                <a:ext cx="8971722" cy="940904"/>
+              </a:xfrm>
+              <a:prstGeom prst="rect">
+                <a:avLst/>
+              </a:prstGeom>
+              <a:ln>
+                <a:solidFill>
+                  <a:schemeClr val="bg1"/>
+                </a:solidFill>
+              </a:ln>
+            </p:spPr>
+            <p:style>
+              <a:lnRef idx="2">
+                <a:schemeClr val="accent6"/>
+              </a:lnRef>
+              <a:fillRef idx="1">
+                <a:schemeClr val="lt1"/>
+              </a:fillRef>
+              <a:effectRef idx="0">
+                <a:schemeClr val="accent6"/>
+              </a:effectRef>
+              <a:fontRef idx="minor">
+                <a:schemeClr val="dk1"/>
+              </a:fontRef>
+            </p:style>
+            <p:txBody>
+              <a:bodyPr rtlCol="0" anchor="ctr"/>
+              <a:lstStyle/>
+              <a:p>
+                <a:pPr algn="ctr"/>
+                <a:endParaRPr lang="pt-BR"/>
+              </a:p>
+            </p:txBody>
+          </p:sp>
+          <p:sp>
+            <p:nvSpPr>
+              <p:cNvPr id="10" name="Retângulo 9">
+                <a:extLst>
+                  <a:ext uri="{FF2B5EF4-FFF2-40B4-BE49-F238E27FC236}">
+                    <a16:creationId xmlns:a16="http://schemas.microsoft.com/office/drawing/2014/main" id="{8047B2E2-6F66-4974-BAE1-883647A50021}"/>
+                  </a:ext>
+                </a:extLst>
+              </p:cNvPr>
+              <p:cNvSpPr/>
+              <p:nvPr/>
+            </p:nvSpPr>
+            <p:spPr>
+              <a:xfrm>
+                <a:off x="2955233" y="3667158"/>
+                <a:ext cx="8971722" cy="940904"/>
+              </a:xfrm>
+              <a:prstGeom prst="rect">
+                <a:avLst/>
+              </a:prstGeom>
+              <a:ln>
+                <a:solidFill>
+                  <a:schemeClr val="bg1"/>
+                </a:solidFill>
+              </a:ln>
+            </p:spPr>
+            <p:style>
+              <a:lnRef idx="2">
+                <a:schemeClr val="accent6"/>
+              </a:lnRef>
+              <a:fillRef idx="1">
+                <a:schemeClr val="lt1"/>
+              </a:fillRef>
+              <a:effectRef idx="0">
+                <a:schemeClr val="accent6"/>
+              </a:effectRef>
+              <a:fontRef idx="minor">
+                <a:schemeClr val="dk1"/>
+              </a:fontRef>
+            </p:style>
+            <p:txBody>
+              <a:bodyPr rtlCol="0" anchor="ctr"/>
+              <a:lstStyle/>
+              <a:p>
+                <a:pPr algn="ctr"/>
+                <a:endParaRPr lang="pt-BR"/>
+              </a:p>
+            </p:txBody>
+          </p:sp>
+          <p:sp>
+            <p:nvSpPr>
+              <p:cNvPr id="11" name="Retângulo 10">
+                <a:extLst>
+                  <a:ext uri="{FF2B5EF4-FFF2-40B4-BE49-F238E27FC236}">
+                    <a16:creationId xmlns:a16="http://schemas.microsoft.com/office/drawing/2014/main" id="{07959A09-FA09-46A2-8A15-2268A9F4FB53}"/>
+                  </a:ext>
+                </a:extLst>
+              </p:cNvPr>
+              <p:cNvSpPr/>
+              <p:nvPr/>
+            </p:nvSpPr>
+            <p:spPr>
+              <a:xfrm>
+                <a:off x="2883871" y="4795148"/>
+                <a:ext cx="8971722" cy="940904"/>
+              </a:xfrm>
+              <a:prstGeom prst="rect">
+                <a:avLst/>
+              </a:prstGeom>
+              <a:ln>
+                <a:solidFill>
+                  <a:schemeClr val="bg1"/>
+                </a:solidFill>
+              </a:ln>
+            </p:spPr>
+            <p:style>
+              <a:lnRef idx="2">
+                <a:schemeClr val="accent6"/>
+              </a:lnRef>
+              <a:fillRef idx="1">
+                <a:schemeClr val="lt1"/>
+              </a:fillRef>
+              <a:effectRef idx="0">
+                <a:schemeClr val="accent6"/>
+              </a:effectRef>
+              <a:fontRef idx="minor">
+                <a:schemeClr val="dk1"/>
+              </a:fontRef>
+            </p:style>
+            <p:txBody>
+              <a:bodyPr rtlCol="0" anchor="ctr"/>
+              <a:lstStyle/>
+              <a:p>
+                <a:pPr algn="ctr"/>
+                <a:endParaRPr lang="pt-BR"/>
+              </a:p>
+            </p:txBody>
+          </p:sp>
+        </p:grpSp>
+      </p:grpSp>
+    </p:spTree>
+    <p:extLst>
+      <p:ext uri="{BB962C8B-B14F-4D97-AF65-F5344CB8AC3E}">
+        <p14:creationId xmlns:p14="http://schemas.microsoft.com/office/powerpoint/2010/main" val="1412207684"/>
       </p:ext>
     </p:extLst>
   </p:cSld>
@@ -5350,12 +5493,9 @@
 </file>
 
 <file path=customXml/item1.xml><?xml version="1.0" encoding="utf-8"?>
-<?mso-contentType ?>
-<FormTemplates xmlns="http://schemas.microsoft.com/sharepoint/v3/contenttype/forms">
-  <Display>DocumentLibraryForm</Display>
-  <Edit>DocumentLibraryForm</Edit>
-  <New>DocumentLibraryForm</New>
-</FormTemplates>
+<p:properties xmlns:p="http://schemas.microsoft.com/office/2006/metadata/properties" xmlns:xsi="http://www.w3.org/2001/XMLSchema-instance" xmlns:pc="http://schemas.microsoft.com/office/infopath/2007/PartnerControls">
+  <documentManagement/>
+</p:properties>
 </file>
 
 <file path=customXml/item2.xml><?xml version="1.0" encoding="utf-8"?>
@@ -5544,15 +5684,27 @@
 </file>
 
 <file path=customXml/item3.xml><?xml version="1.0" encoding="utf-8"?>
-<p:properties xmlns:p="http://schemas.microsoft.com/office/2006/metadata/properties" xmlns:xsi="http://www.w3.org/2001/XMLSchema-instance" xmlns:pc="http://schemas.microsoft.com/office/infopath/2007/PartnerControls">
-  <documentManagement/>
-</p:properties>
+<?mso-contentType ?>
+<FormTemplates xmlns="http://schemas.microsoft.com/sharepoint/v3/contenttype/forms">
+  <Display>DocumentLibraryForm</Display>
+  <Edit>DocumentLibraryForm</Edit>
+  <New>DocumentLibraryForm</New>
+</FormTemplates>
 </file>
 
 <file path=customXml/itemProps1.xml><?xml version="1.0" encoding="utf-8"?>
-<ds:datastoreItem xmlns:ds="http://schemas.openxmlformats.org/officeDocument/2006/customXml" ds:itemID="{FB3C2730-0377-47B6-8B4E-F18BBA759BBC}">
+<ds:datastoreItem xmlns:ds="http://schemas.openxmlformats.org/officeDocument/2006/customXml" ds:itemID="{16F5BE80-B5BE-46B2-A8FF-4191F8B8B439}">
   <ds:schemaRefs>
-    <ds:schemaRef ds:uri="http://schemas.microsoft.com/sharepoint/v3/contenttype/forms"/>
+    <ds:schemaRef ds:uri="http://schemas.microsoft.com/office/2006/documentManagement/types"/>
+    <ds:schemaRef ds:uri="http://purl.org/dc/elements/1.1/"/>
+    <ds:schemaRef ds:uri="c14df721-83d0-478d-aefc-5e63513a87b4"/>
+    <ds:schemaRef ds:uri="659efe37-a1ff-41bd-b7f7-e81fdb610ca5"/>
+    <ds:schemaRef ds:uri="http://schemas.microsoft.com/office/2006/metadata/properties"/>
+    <ds:schemaRef ds:uri="http://schemas.microsoft.com/office/infopath/2007/PartnerControls"/>
+    <ds:schemaRef ds:uri="http://schemas.openxmlformats.org/package/2006/metadata/core-properties"/>
+    <ds:schemaRef ds:uri="http://www.w3.org/XML/1998/namespace"/>
+    <ds:schemaRef ds:uri="http://purl.org/dc/dcmitype/"/>
+    <ds:schemaRef ds:uri="http://purl.org/dc/terms/"/>
   </ds:schemaRefs>
 </ds:datastoreItem>
 </file>
@@ -5577,18 +5729,9 @@
 </file>
 
 <file path=customXml/itemProps3.xml><?xml version="1.0" encoding="utf-8"?>
-<ds:datastoreItem xmlns:ds="http://schemas.openxmlformats.org/officeDocument/2006/customXml" ds:itemID="{16F5BE80-B5BE-46B2-A8FF-4191F8B8B439}">
+<ds:datastoreItem xmlns:ds="http://schemas.openxmlformats.org/officeDocument/2006/customXml" ds:itemID="{FB3C2730-0377-47B6-8B4E-F18BBA759BBC}">
   <ds:schemaRefs>
-    <ds:schemaRef ds:uri="http://schemas.microsoft.com/office/2006/documentManagement/types"/>
-    <ds:schemaRef ds:uri="http://purl.org/dc/elements/1.1/"/>
-    <ds:schemaRef ds:uri="c14df721-83d0-478d-aefc-5e63513a87b4"/>
-    <ds:schemaRef ds:uri="659efe37-a1ff-41bd-b7f7-e81fdb610ca5"/>
-    <ds:schemaRef ds:uri="http://schemas.microsoft.com/office/2006/metadata/properties"/>
-    <ds:schemaRef ds:uri="http://schemas.microsoft.com/office/infopath/2007/PartnerControls"/>
-    <ds:schemaRef ds:uri="http://schemas.openxmlformats.org/package/2006/metadata/core-properties"/>
-    <ds:schemaRef ds:uri="http://www.w3.org/XML/1998/namespace"/>
-    <ds:schemaRef ds:uri="http://purl.org/dc/dcmitype/"/>
-    <ds:schemaRef ds:uri="http://purl.org/dc/terms/"/>
+    <ds:schemaRef ds:uri="http://schemas.microsoft.com/sharepoint/v3/contenttype/forms"/>
   </ds:schemaRefs>
 </ds:datastoreItem>
 </file>
</xml_diff>